<commit_message>
Implemented image transcription for embedded objects in documents like .pptx, .docx, .html
</commit_message>
<xml_diff>
--- a/tests/test_files/test.pptx
+++ b/tests/test_files/test.pptx
@@ -8,6 +8,7 @@
     <p:sldId id="256" r:id="rId2"/>
     <p:sldId id="257" r:id="rId3"/>
     <p:sldId id="258" r:id="rId4"/>
+    <p:sldId id="259" r:id="rId5"/>
   </p:sldIdLst>
   <p:sldSz cx="12192000" cy="6858000"/>
   <p:notesSz cx="6858000" cy="9144000"/>
@@ -261,7 +262,7 @@
           <a:p>
             <a:fld id="{71E1FA23-2560-4B92-B796-4AF66AC1B7E7}" type="datetimeFigureOut">
               <a:rPr lang="en-US" smtClean="0"/>
-              <a:t>3/15/2024</a:t>
+              <a:t>12/18/2024</a:t>
             </a:fld>
             <a:endParaRPr lang="en-US"/>
           </a:p>
@@ -459,7 +460,7 @@
           <a:p>
             <a:fld id="{71E1FA23-2560-4B92-B796-4AF66AC1B7E7}" type="datetimeFigureOut">
               <a:rPr lang="en-US" smtClean="0"/>
-              <a:t>3/15/2024</a:t>
+              <a:t>12/18/2024</a:t>
             </a:fld>
             <a:endParaRPr lang="en-US"/>
           </a:p>
@@ -667,7 +668,7 @@
           <a:p>
             <a:fld id="{71E1FA23-2560-4B92-B796-4AF66AC1B7E7}" type="datetimeFigureOut">
               <a:rPr lang="en-US" smtClean="0"/>
-              <a:t>3/15/2024</a:t>
+              <a:t>12/18/2024</a:t>
             </a:fld>
             <a:endParaRPr lang="en-US"/>
           </a:p>
@@ -865,7 +866,7 @@
           <a:p>
             <a:fld id="{71E1FA23-2560-4B92-B796-4AF66AC1B7E7}" type="datetimeFigureOut">
               <a:rPr lang="en-US" smtClean="0"/>
-              <a:t>3/15/2024</a:t>
+              <a:t>12/18/2024</a:t>
             </a:fld>
             <a:endParaRPr lang="en-US"/>
           </a:p>
@@ -1140,7 +1141,7 @@
           <a:p>
             <a:fld id="{71E1FA23-2560-4B92-B796-4AF66AC1B7E7}" type="datetimeFigureOut">
               <a:rPr lang="en-US" smtClean="0"/>
-              <a:t>3/15/2024</a:t>
+              <a:t>12/18/2024</a:t>
             </a:fld>
             <a:endParaRPr lang="en-US"/>
           </a:p>
@@ -1405,7 +1406,7 @@
           <a:p>
             <a:fld id="{71E1FA23-2560-4B92-B796-4AF66AC1B7E7}" type="datetimeFigureOut">
               <a:rPr lang="en-US" smtClean="0"/>
-              <a:t>3/15/2024</a:t>
+              <a:t>12/18/2024</a:t>
             </a:fld>
             <a:endParaRPr lang="en-US"/>
           </a:p>
@@ -1817,7 +1818,7 @@
           <a:p>
             <a:fld id="{71E1FA23-2560-4B92-B796-4AF66AC1B7E7}" type="datetimeFigureOut">
               <a:rPr lang="en-US" smtClean="0"/>
-              <a:t>3/15/2024</a:t>
+              <a:t>12/18/2024</a:t>
             </a:fld>
             <a:endParaRPr lang="en-US"/>
           </a:p>
@@ -1958,7 +1959,7 @@
           <a:p>
             <a:fld id="{71E1FA23-2560-4B92-B796-4AF66AC1B7E7}" type="datetimeFigureOut">
               <a:rPr lang="en-US" smtClean="0"/>
-              <a:t>3/15/2024</a:t>
+              <a:t>12/18/2024</a:t>
             </a:fld>
             <a:endParaRPr lang="en-US"/>
           </a:p>
@@ -2071,7 +2072,7 @@
           <a:p>
             <a:fld id="{71E1FA23-2560-4B92-B796-4AF66AC1B7E7}" type="datetimeFigureOut">
               <a:rPr lang="en-US" smtClean="0"/>
-              <a:t>3/15/2024</a:t>
+              <a:t>12/18/2024</a:t>
             </a:fld>
             <a:endParaRPr lang="en-US"/>
           </a:p>
@@ -2382,7 +2383,7 @@
           <a:p>
             <a:fld id="{71E1FA23-2560-4B92-B796-4AF66AC1B7E7}" type="datetimeFigureOut">
               <a:rPr lang="en-US" smtClean="0"/>
-              <a:t>3/15/2024</a:t>
+              <a:t>12/18/2024</a:t>
             </a:fld>
             <a:endParaRPr lang="en-US"/>
           </a:p>
@@ -2670,7 +2671,7 @@
           <a:p>
             <a:fld id="{71E1FA23-2560-4B92-B796-4AF66AC1B7E7}" type="datetimeFigureOut">
               <a:rPr lang="en-US" smtClean="0"/>
-              <a:t>3/15/2024</a:t>
+              <a:t>12/18/2024</a:t>
             </a:fld>
             <a:endParaRPr lang="en-US"/>
           </a:p>
@@ -2911,7 +2912,7 @@
           <a:p>
             <a:fld id="{71E1FA23-2560-4B92-B796-4AF66AC1B7E7}" type="datetimeFigureOut">
               <a:rPr lang="en-US" smtClean="0"/>
-              <a:t>3/15/2024</a:t>
+              <a:t>12/18/2024</a:t>
             </a:fld>
             <a:endParaRPr lang="en-US"/>
           </a:p>
@@ -4238,6 +4239,113 @@
 </p:sld>
 </file>
 
+<file path=ppt/slides/slide4.xml><?xml version="1.0" encoding="utf-8"?>
+<p:sld xmlns:a="http://schemas.openxmlformats.org/drawingml/2006/main" xmlns:r="http://schemas.openxmlformats.org/officeDocument/2006/relationships" xmlns:p="http://schemas.openxmlformats.org/presentationml/2006/main">
+  <p:cSld>
+    <p:spTree>
+      <p:nvGrpSpPr>
+        <p:cNvPr id="1" name=""/>
+        <p:cNvGrpSpPr/>
+        <p:nvPr/>
+      </p:nvGrpSpPr>
+      <p:grpSpPr>
+        <a:xfrm>
+          <a:off x="0" y="0"/>
+          <a:ext cx="0" cy="0"/>
+          <a:chOff x="0" y="0"/>
+          <a:chExt cx="0" cy="0"/>
+        </a:xfrm>
+      </p:grpSpPr>
+      <p:sp>
+        <p:nvSpPr>
+          <p:cNvPr id="2" name="Title 1">
+            <a:extLst>
+              <a:ext uri="{FF2B5EF4-FFF2-40B4-BE49-F238E27FC236}">
+                <a16:creationId xmlns:a16="http://schemas.microsoft.com/office/drawing/2014/main" id="{D518FD53-D861-2040-59F6-F2B97F1CFACD}"/>
+              </a:ext>
+            </a:extLst>
+          </p:cNvPr>
+          <p:cNvSpPr>
+            <a:spLocks noGrp="1"/>
+          </p:cNvSpPr>
+          <p:nvPr>
+            <p:ph type="title"/>
+          </p:nvPr>
+        </p:nvSpPr>
+        <p:spPr/>
+        <p:txBody>
+          <a:bodyPr/>
+          <a:lstStyle/>
+          <a:p>
+            <a:r>
+              <a:rPr lang="pt-BR" dirty="0"/>
+              <a:t>Overview</a:t>
+            </a:r>
+          </a:p>
+        </p:txBody>
+      </p:sp>
+      <p:pic>
+        <p:nvPicPr>
+          <p:cNvPr id="1026" name="Picture 2" descr="Microsoft Azure solution architecture brainstorming buddy via RAG | by  Anurag Chatterjee | Medium">
+            <a:extLst>
+              <a:ext uri="{FF2B5EF4-FFF2-40B4-BE49-F238E27FC236}">
+                <a16:creationId xmlns:a16="http://schemas.microsoft.com/office/drawing/2014/main" id="{0BBD055F-D504-FF02-2CD2-969EE5805203}"/>
+              </a:ext>
+            </a:extLst>
+          </p:cNvPr>
+          <p:cNvPicPr>
+            <a:picLocks noGrp="1" noChangeAspect="1" noChangeArrowheads="1"/>
+          </p:cNvPicPr>
+          <p:nvPr>
+            <p:ph idx="1"/>
+          </p:nvPr>
+        </p:nvPicPr>
+        <p:blipFill>
+          <a:blip r:embed="rId2">
+            <a:extLst>
+              <a:ext uri="{28A0092B-C50C-407E-A947-70E740481C1C}">
+                <a14:useLocalDpi xmlns:a14="http://schemas.microsoft.com/office/drawing/2010/main" val="0"/>
+              </a:ext>
+            </a:extLst>
+          </a:blip>
+          <a:srcRect/>
+          <a:stretch>
+            <a:fillRect/>
+          </a:stretch>
+        </p:blipFill>
+        <p:spPr bwMode="auto">
+          <a:xfrm>
+            <a:off x="2400127" y="1825625"/>
+            <a:ext cx="7391746" cy="4351338"/>
+          </a:xfrm>
+          <a:prstGeom prst="rect">
+            <a:avLst/>
+          </a:prstGeom>
+          <a:noFill/>
+          <a:extLst>
+            <a:ext uri="{909E8E84-426E-40DD-AFC4-6F175D3DCCD1}">
+              <a14:hiddenFill xmlns:a14="http://schemas.microsoft.com/office/drawing/2010/main">
+                <a:solidFill>
+                  <a:srgbClr val="FFFFFF"/>
+                </a:solidFill>
+              </a14:hiddenFill>
+            </a:ext>
+          </a:extLst>
+        </p:spPr>
+      </p:pic>
+    </p:spTree>
+    <p:extLst>
+      <p:ext uri="{BB962C8B-B14F-4D97-AF65-F5344CB8AC3E}">
+        <p14:creationId xmlns:p14="http://schemas.microsoft.com/office/powerpoint/2010/main" val="2575570769"/>
+      </p:ext>
+    </p:extLst>
+  </p:cSld>
+  <p:clrMapOvr>
+    <a:masterClrMapping/>
+  </p:clrMapOvr>
+</p:sld>
+</file>
+
 <file path=ppt/theme/theme1.xml><?xml version="1.0" encoding="utf-8"?>
 <a:theme xmlns:a="http://schemas.openxmlformats.org/drawingml/2006/main" name="Office Theme">
   <a:themeElements>
@@ -4555,6 +4663,7 @@
 
 <file path=docMetadata/LabelInfo.xml><?xml version="1.0" encoding="utf-8"?>
 <clbl:labelList xmlns:clbl="http://schemas.microsoft.com/office/2020/mipLabelMetadata">
+  <clbl:label id="{5fae8262-b78e-4366-8929-a5d6aac95320}" enabled="1" method="Standard" siteId="{cf36141c-ddd7-45a7-b073-111f66d0b30c}" contentBits="0" removed="0"/>
   <clbl:label id="{f42aa342-8706-4288-bd11-ebb85995028c}" enabled="1" method="Standard" siteId="{72f988bf-86f1-41af-91ab-2d7cd011db47}" contentBits="0" removed="0"/>
 </clbl:labelList>
 </file>
</xml_diff>

<commit_message>
Test for PPTX conversion with OpenAI client
Signed-off-by: Hankyeol Kyung <kghnkl0103@gmail.com>
</commit_message>
<xml_diff>
--- a/tests/test_files/test.pptx
+++ b/tests/test_files/test.pptx
@@ -9,6 +9,7 @@
     <p:sldId id="257" r:id="rId3"/>
     <p:sldId id="258" r:id="rId4"/>
     <p:sldId id="259" r:id="rId5"/>
+    <p:sldId id="260" r:id="rId6"/>
   </p:sldIdLst>
   <p:sldSz cx="12192000" cy="6858000"/>
   <p:notesSz cx="6858000" cy="9144000"/>
@@ -118,7 +119,7 @@
 <file path=ppt/revisionInfo.xml><?xml version="1.0" encoding="utf-8"?>
 <p1510:revInfo xmlns:a="http://schemas.openxmlformats.org/drawingml/2006/main" xmlns:r="http://schemas.openxmlformats.org/officeDocument/2006/relationships" xmlns:p1510="http://schemas.microsoft.com/office/powerpoint/2015/10/main">
   <p1510:revLst>
-    <p1510:client id="{42B5B1D2-4436-5E72-09ED-6B03C2299777}" v="23" dt="2024-12-15T04:16:58.235"/>
+    <p1510:client id="{C1CE531F-D02C-46A2-ADD3-DF30A15EC006}" v="20" dt="2024-12-27T06:53:28.653"/>
   </p1510:revLst>
 </p1510:revInfo>
 </file>
@@ -126,7 +127,7 @@
 <file path=ppt/charts/chart1.xml><?xml version="1.0" encoding="utf-8"?>
 <c:chartSpace xmlns:c="http://schemas.openxmlformats.org/drawingml/2006/chart" xmlns:a="http://schemas.openxmlformats.org/drawingml/2006/main" xmlns:r="http://schemas.openxmlformats.org/officeDocument/2006/relationships" xmlns:c16r2="http://schemas.microsoft.com/office/drawing/2015/06/chart">
   <c:date1904 val="0"/>
-  <c:lang val="ja-JP"/>
+  <c:lang val="ko-KR"/>
   <c:roundedCorners val="0"/>
   <mc:AlternateContent xmlns:mc="http://schemas.openxmlformats.org/markup-compatibility/2006">
     <mc:Choice xmlns:c14="http://schemas.microsoft.com/office/drawing/2007/8/2/chart" Requires="c14">
@@ -144,7 +145,7 @@
           <a:lstStyle/>
           <a:p>
             <a:pPr>
-              <a:defRPr sz="1862" b="0" i="0" u="none" strike="noStrike" kern="1200" spc="0" baseline="0">
+              <a:defRPr lang="ja-JP" sz="1862" b="0" i="0" u="none" strike="noStrike" kern="1200" spc="0" baseline="0">
                 <a:solidFill>
                   <a:schemeClr val="tx1">
                     <a:lumMod val="65000"/>
@@ -176,7 +177,7 @@
         <a:lstStyle/>
         <a:p>
           <a:pPr>
-            <a:defRPr sz="1862" b="0" i="0" u="none" strike="noStrike" kern="1200" spc="0" baseline="0">
+            <a:defRPr lang="ja-JP" sz="1862" b="0" i="0" u="none" strike="noStrike" kern="1200" spc="0" baseline="0">
               <a:solidFill>
                 <a:schemeClr val="tx1">
                   <a:lumMod val="65000"/>
@@ -313,7 +314,7 @@
           <a:lstStyle/>
           <a:p>
             <a:pPr>
-              <a:defRPr sz="1197" b="0" i="0" u="none" strike="noStrike" kern="1200" baseline="0">
+              <a:defRPr lang="ja-JP" sz="1197" b="0" i="0" u="none" strike="noStrike" kern="1200" baseline="0">
                 <a:solidFill>
                   <a:schemeClr val="tx1">
                     <a:lumMod val="65000"/>
@@ -372,7 +373,7 @@
           <a:lstStyle/>
           <a:p>
             <a:pPr>
-              <a:defRPr sz="1197" b="0" i="0" u="none" strike="noStrike" kern="1200" baseline="0">
+              <a:defRPr lang="ja-JP" sz="1197" b="0" i="0" u="none" strike="noStrike" kern="1200" baseline="0">
                 <a:solidFill>
                   <a:schemeClr val="tx1">
                     <a:lumMod val="65000"/>
@@ -414,7 +415,7 @@
         <a:lstStyle/>
         <a:p>
           <a:pPr>
-            <a:defRPr sz="1197" b="0" i="0" u="none" strike="noStrike" kern="1200" baseline="0">
+            <a:defRPr lang="ja-JP" sz="1197" b="0" i="0" u="none" strike="noStrike" kern="1200" baseline="0">
               <a:solidFill>
                 <a:schemeClr val="tx1">
                   <a:lumMod val="65000"/>
@@ -1147,7 +1148,7 @@
           <a:p>
             <a:fld id="{71E1FA23-2560-4B92-B796-4AF66AC1B7E7}" type="datetimeFigureOut">
               <a:rPr lang="en-US" smtClean="0"/>
-              <a:t>12/14/2024</a:t>
+              <a:t>12/26/2024</a:t>
             </a:fld>
             <a:endParaRPr lang="en-US"/>
           </a:p>
@@ -1345,7 +1346,7 @@
           <a:p>
             <a:fld id="{71E1FA23-2560-4B92-B796-4AF66AC1B7E7}" type="datetimeFigureOut">
               <a:rPr lang="en-US" smtClean="0"/>
-              <a:t>12/14/2024</a:t>
+              <a:t>12/26/2024</a:t>
             </a:fld>
             <a:endParaRPr lang="en-US"/>
           </a:p>
@@ -1553,7 +1554,7 @@
           <a:p>
             <a:fld id="{71E1FA23-2560-4B92-B796-4AF66AC1B7E7}" type="datetimeFigureOut">
               <a:rPr lang="en-US" smtClean="0"/>
-              <a:t>12/14/2024</a:t>
+              <a:t>12/26/2024</a:t>
             </a:fld>
             <a:endParaRPr lang="en-US"/>
           </a:p>
@@ -1751,7 +1752,7 @@
           <a:p>
             <a:fld id="{71E1FA23-2560-4B92-B796-4AF66AC1B7E7}" type="datetimeFigureOut">
               <a:rPr lang="en-US" smtClean="0"/>
-              <a:t>12/14/2024</a:t>
+              <a:t>12/26/2024</a:t>
             </a:fld>
             <a:endParaRPr lang="en-US"/>
           </a:p>
@@ -2026,7 +2027,7 @@
           <a:p>
             <a:fld id="{71E1FA23-2560-4B92-B796-4AF66AC1B7E7}" type="datetimeFigureOut">
               <a:rPr lang="en-US" smtClean="0"/>
-              <a:t>12/14/2024</a:t>
+              <a:t>12/26/2024</a:t>
             </a:fld>
             <a:endParaRPr lang="en-US"/>
           </a:p>
@@ -2291,7 +2292,7 @@
           <a:p>
             <a:fld id="{71E1FA23-2560-4B92-B796-4AF66AC1B7E7}" type="datetimeFigureOut">
               <a:rPr lang="en-US" smtClean="0"/>
-              <a:t>12/14/2024</a:t>
+              <a:t>12/26/2024</a:t>
             </a:fld>
             <a:endParaRPr lang="en-US"/>
           </a:p>
@@ -2703,7 +2704,7 @@
           <a:p>
             <a:fld id="{71E1FA23-2560-4B92-B796-4AF66AC1B7E7}" type="datetimeFigureOut">
               <a:rPr lang="en-US" smtClean="0"/>
-              <a:t>12/14/2024</a:t>
+              <a:t>12/26/2024</a:t>
             </a:fld>
             <a:endParaRPr lang="en-US"/>
           </a:p>
@@ -2844,7 +2845,7 @@
           <a:p>
             <a:fld id="{71E1FA23-2560-4B92-B796-4AF66AC1B7E7}" type="datetimeFigureOut">
               <a:rPr lang="en-US" smtClean="0"/>
-              <a:t>12/14/2024</a:t>
+              <a:t>12/26/2024</a:t>
             </a:fld>
             <a:endParaRPr lang="en-US"/>
           </a:p>
@@ -2957,7 +2958,7 @@
           <a:p>
             <a:fld id="{71E1FA23-2560-4B92-B796-4AF66AC1B7E7}" type="datetimeFigureOut">
               <a:rPr lang="en-US" smtClean="0"/>
-              <a:t>12/14/2024</a:t>
+              <a:t>12/26/2024</a:t>
             </a:fld>
             <a:endParaRPr lang="en-US"/>
           </a:p>
@@ -3268,7 +3269,7 @@
           <a:p>
             <a:fld id="{71E1FA23-2560-4B92-B796-4AF66AC1B7E7}" type="datetimeFigureOut">
               <a:rPr lang="en-US" smtClean="0"/>
-              <a:t>12/14/2024</a:t>
+              <a:t>12/26/2024</a:t>
             </a:fld>
             <a:endParaRPr lang="en-US"/>
           </a:p>
@@ -3556,7 +3557,7 @@
           <a:p>
             <a:fld id="{71E1FA23-2560-4B92-B796-4AF66AC1B7E7}" type="datetimeFigureOut">
               <a:rPr lang="en-US" smtClean="0"/>
-              <a:t>12/14/2024</a:t>
+              <a:t>12/26/2024</a:t>
             </a:fld>
             <a:endParaRPr lang="en-US"/>
           </a:p>
@@ -3797,7 +3798,7 @@
           <a:p>
             <a:fld id="{71E1FA23-2560-4B92-B796-4AF66AC1B7E7}" type="datetimeFigureOut">
               <a:rPr lang="en-US" smtClean="0"/>
-              <a:t>12/14/2024</a:t>
+              <a:t>12/26/2024</a:t>
             </a:fld>
             <a:endParaRPr lang="en-US"/>
           </a:p>
@@ -5213,6 +5214,205 @@
 </p:sld>
 </file>
 
+<file path=ppt/slides/slide5.xml><?xml version="1.0" encoding="utf-8"?>
+<p:sld xmlns:a="http://schemas.openxmlformats.org/drawingml/2006/main" xmlns:r="http://schemas.openxmlformats.org/officeDocument/2006/relationships" xmlns:p="http://schemas.openxmlformats.org/presentationml/2006/main">
+  <p:cSld>
+    <p:spTree>
+      <p:nvGrpSpPr>
+        <p:cNvPr id="1" name=""/>
+        <p:cNvGrpSpPr/>
+        <p:nvPr/>
+      </p:nvGrpSpPr>
+      <p:grpSpPr>
+        <a:xfrm>
+          <a:off x="0" y="0"/>
+          <a:ext cx="0" cy="0"/>
+          <a:chOff x="0" y="0"/>
+          <a:chExt cx="0" cy="0"/>
+        </a:xfrm>
+      </p:grpSpPr>
+      <p:sp>
+        <p:nvSpPr>
+          <p:cNvPr id="2" name="제목 1">
+            <a:extLst>
+              <a:ext uri="{FF2B5EF4-FFF2-40B4-BE49-F238E27FC236}">
+                <a16:creationId xmlns:a16="http://schemas.microsoft.com/office/drawing/2014/main" id="{90E1BE51-1698-A354-A7E5-AEF6867DB0B9}"/>
+              </a:ext>
+            </a:extLst>
+          </p:cNvPr>
+          <p:cNvSpPr>
+            <a:spLocks noGrp="1"/>
+          </p:cNvSpPr>
+          <p:nvPr>
+            <p:ph type="title"/>
+          </p:nvPr>
+        </p:nvSpPr>
+        <p:spPr/>
+        <p:txBody>
+          <a:bodyPr/>
+          <a:lstStyle/>
+          <a:p>
+            <a:r>
+              <a:rPr lang="ko-KR" altLang="en-US" dirty="0" err="1">
+                <a:ea typeface="맑은 고딕"/>
+              </a:rPr>
+              <a:t>A</a:t>
+            </a:r>
+            <a:r>
+              <a:rPr lang="ko-KR" altLang="en-US" dirty="0">
+                <a:ea typeface="맑은 고딕"/>
+              </a:rPr>
+              <a:t> </a:t>
+            </a:r>
+            <a:r>
+              <a:rPr lang="ko-KR" altLang="en-US" dirty="0" err="1">
+                <a:ea typeface="맑은 고딕"/>
+              </a:rPr>
+              <a:t>image</a:t>
+            </a:r>
+            <a:r>
+              <a:rPr lang="ko-KR" altLang="en-US" dirty="0">
+                <a:ea typeface="맑은 고딕"/>
+              </a:rPr>
+              <a:t> </a:t>
+            </a:r>
+            <a:r>
+              <a:rPr lang="ko-KR" altLang="en-US" dirty="0" err="1">
+                <a:ea typeface="맑은 고딕"/>
+              </a:rPr>
+              <a:t>to</a:t>
+            </a:r>
+            <a:r>
+              <a:rPr lang="ko-KR" altLang="en-US" dirty="0">
+                <a:ea typeface="맑은 고딕"/>
+              </a:rPr>
+              <a:t> </a:t>
+            </a:r>
+            <a:r>
+              <a:rPr lang="ko-KR" altLang="en-US" dirty="0" err="1">
+                <a:ea typeface="맑은 고딕"/>
+              </a:rPr>
+              <a:t>test</a:t>
+            </a:r>
+            <a:r>
+              <a:rPr lang="ko-KR" altLang="en-US" dirty="0">
+                <a:ea typeface="맑은 고딕"/>
+              </a:rPr>
+              <a:t> </a:t>
+            </a:r>
+            <a:r>
+              <a:rPr lang="ko-KR" altLang="en-US">
+                <a:ea typeface="맑은 고딕"/>
+              </a:rPr>
+              <a:t>description</a:t>
+            </a:r>
+            <a:endParaRPr lang="ko-KR" altLang="en-US" dirty="0" err="1"/>
+          </a:p>
+        </p:txBody>
+      </p:sp>
+      <p:pic>
+        <p:nvPicPr>
+          <p:cNvPr id="4" name="그림 3" descr="별, 창의성이(가) 표시된 사진&#10;&#10;자동 생성된 설명">
+            <a:extLst>
+              <a:ext uri="{FF2B5EF4-FFF2-40B4-BE49-F238E27FC236}">
+                <a16:creationId xmlns:a16="http://schemas.microsoft.com/office/drawing/2014/main" id="{9E71DE63-AB90-68BC-6D4C-E136454CB874}"/>
+              </a:ext>
+            </a:extLst>
+          </p:cNvPr>
+          <p:cNvPicPr>
+            <a:picLocks noChangeAspect="1"/>
+          </p:cNvPicPr>
+          <p:nvPr/>
+        </p:nvPicPr>
+        <p:blipFill>
+          <a:blip r:embed="rId2"/>
+          <a:stretch>
+            <a:fillRect/>
+          </a:stretch>
+        </p:blipFill>
+        <p:spPr>
+          <a:xfrm>
+            <a:off x="1778858" y="2921858"/>
+            <a:ext cx="952500" cy="952500"/>
+          </a:xfrm>
+          <a:prstGeom prst="rect">
+            <a:avLst/>
+          </a:prstGeom>
+        </p:spPr>
+      </p:pic>
+      <p:pic>
+        <p:nvPicPr>
+          <p:cNvPr id="5" name="그림 4" descr="삼각형, 일렉트릭 블루이(가) 표시된 사진&#10;&#10;자동 생성된 설명">
+            <a:extLst>
+              <a:ext uri="{FF2B5EF4-FFF2-40B4-BE49-F238E27FC236}">
+                <a16:creationId xmlns:a16="http://schemas.microsoft.com/office/drawing/2014/main" id="{DCFB312E-19F1-E840-CC81-CE0AF2299119}"/>
+              </a:ext>
+            </a:extLst>
+          </p:cNvPr>
+          <p:cNvPicPr>
+            <a:picLocks noChangeAspect="1"/>
+          </p:cNvPicPr>
+          <p:nvPr/>
+        </p:nvPicPr>
+        <p:blipFill>
+          <a:blip r:embed="rId3"/>
+          <a:stretch>
+            <a:fillRect/>
+          </a:stretch>
+        </p:blipFill>
+        <p:spPr>
+          <a:xfrm>
+            <a:off x="2458480" y="4857750"/>
+            <a:ext cx="952500" cy="952500"/>
+          </a:xfrm>
+          <a:prstGeom prst="rect">
+            <a:avLst/>
+          </a:prstGeom>
+        </p:spPr>
+      </p:pic>
+      <p:pic>
+        <p:nvPicPr>
+          <p:cNvPr id="6" name="그림 5" descr="텍스트, 직사각형, 레드, 디자인이(가) 표시된 사진&#10;&#10;자동 생성된 설명">
+            <a:extLst>
+              <a:ext uri="{FF2B5EF4-FFF2-40B4-BE49-F238E27FC236}">
+                <a16:creationId xmlns:a16="http://schemas.microsoft.com/office/drawing/2014/main" id="{1BB44C2D-2A50-F2FE-D42C-9CD8B9838F46}"/>
+              </a:ext>
+            </a:extLst>
+          </p:cNvPr>
+          <p:cNvPicPr>
+            <a:picLocks noChangeAspect="1"/>
+          </p:cNvPicPr>
+          <p:nvPr/>
+        </p:nvPicPr>
+        <p:blipFill>
+          <a:blip r:embed="rId4"/>
+          <a:stretch>
+            <a:fillRect/>
+          </a:stretch>
+        </p:blipFill>
+        <p:spPr>
+          <a:xfrm>
+            <a:off x="4950329" y="3568759"/>
+            <a:ext cx="952500" cy="952500"/>
+          </a:xfrm>
+          <a:prstGeom prst="rect">
+            <a:avLst/>
+          </a:prstGeom>
+        </p:spPr>
+      </p:pic>
+    </p:spTree>
+    <p:extLst>
+      <p:ext uri="{BB962C8B-B14F-4D97-AF65-F5344CB8AC3E}">
+        <p14:creationId xmlns:p14="http://schemas.microsoft.com/office/powerpoint/2010/main" val="4117633757"/>
+      </p:ext>
+    </p:extLst>
+  </p:cSld>
+  <p:clrMapOvr>
+    <a:masterClrMapping/>
+  </p:clrMapOvr>
+</p:sld>
+</file>
+
 <file path=ppt/theme/theme1.xml><?xml version="1.0" encoding="utf-8"?>
 <a:theme xmlns:a="http://schemas.openxmlformats.org/drawingml/2006/main" name="Office Theme">
   <a:themeElements>

</xml_diff>